<commit_message>
09.02.2023 - Invoice steps processing finalised
</commit_message>
<xml_diff>
--- a/src/static_data/processCharts.pptx
+++ b/src/static_data/processCharts.pptx
@@ -263,7 +263,7 @@
           <a:p>
             <a:fld id="{E3435E70-22ED-4931-A57F-15FCCA1F0CAE}" type="datetimeFigureOut">
               <a:rPr lang="en-GB" smtClean="0"/>
-              <a:t>05/02/2023</a:t>
+              <a:t>08/02/2023</a:t>
             </a:fld>
             <a:endParaRPr lang="en-GB"/>
           </a:p>
@@ -463,7 +463,7 @@
           <a:p>
             <a:fld id="{E3435E70-22ED-4931-A57F-15FCCA1F0CAE}" type="datetimeFigureOut">
               <a:rPr lang="en-GB" smtClean="0"/>
-              <a:t>05/02/2023</a:t>
+              <a:t>08/02/2023</a:t>
             </a:fld>
             <a:endParaRPr lang="en-GB"/>
           </a:p>
@@ -673,7 +673,7 @@
           <a:p>
             <a:fld id="{E3435E70-22ED-4931-A57F-15FCCA1F0CAE}" type="datetimeFigureOut">
               <a:rPr lang="en-GB" smtClean="0"/>
-              <a:t>05/02/2023</a:t>
+              <a:t>08/02/2023</a:t>
             </a:fld>
             <a:endParaRPr lang="en-GB"/>
           </a:p>
@@ -873,7 +873,7 @@
           <a:p>
             <a:fld id="{E3435E70-22ED-4931-A57F-15FCCA1F0CAE}" type="datetimeFigureOut">
               <a:rPr lang="en-GB" smtClean="0"/>
-              <a:t>05/02/2023</a:t>
+              <a:t>08/02/2023</a:t>
             </a:fld>
             <a:endParaRPr lang="en-GB"/>
           </a:p>
@@ -1149,7 +1149,7 @@
           <a:p>
             <a:fld id="{E3435E70-22ED-4931-A57F-15FCCA1F0CAE}" type="datetimeFigureOut">
               <a:rPr lang="en-GB" smtClean="0"/>
-              <a:t>05/02/2023</a:t>
+              <a:t>08/02/2023</a:t>
             </a:fld>
             <a:endParaRPr lang="en-GB"/>
           </a:p>
@@ -1417,7 +1417,7 @@
           <a:p>
             <a:fld id="{E3435E70-22ED-4931-A57F-15FCCA1F0CAE}" type="datetimeFigureOut">
               <a:rPr lang="en-GB" smtClean="0"/>
-              <a:t>05/02/2023</a:t>
+              <a:t>08/02/2023</a:t>
             </a:fld>
             <a:endParaRPr lang="en-GB"/>
           </a:p>
@@ -1832,7 +1832,7 @@
           <a:p>
             <a:fld id="{E3435E70-22ED-4931-A57F-15FCCA1F0CAE}" type="datetimeFigureOut">
               <a:rPr lang="en-GB" smtClean="0"/>
-              <a:t>05/02/2023</a:t>
+              <a:t>08/02/2023</a:t>
             </a:fld>
             <a:endParaRPr lang="en-GB"/>
           </a:p>
@@ -1974,7 +1974,7 @@
           <a:p>
             <a:fld id="{E3435E70-22ED-4931-A57F-15FCCA1F0CAE}" type="datetimeFigureOut">
               <a:rPr lang="en-GB" smtClean="0"/>
-              <a:t>05/02/2023</a:t>
+              <a:t>08/02/2023</a:t>
             </a:fld>
             <a:endParaRPr lang="en-GB"/>
           </a:p>
@@ -2087,7 +2087,7 @@
           <a:p>
             <a:fld id="{E3435E70-22ED-4931-A57F-15FCCA1F0CAE}" type="datetimeFigureOut">
               <a:rPr lang="en-GB" smtClean="0"/>
-              <a:t>05/02/2023</a:t>
+              <a:t>08/02/2023</a:t>
             </a:fld>
             <a:endParaRPr lang="en-GB"/>
           </a:p>
@@ -2400,7 +2400,7 @@
           <a:p>
             <a:fld id="{E3435E70-22ED-4931-A57F-15FCCA1F0CAE}" type="datetimeFigureOut">
               <a:rPr lang="en-GB" smtClean="0"/>
-              <a:t>05/02/2023</a:t>
+              <a:t>08/02/2023</a:t>
             </a:fld>
             <a:endParaRPr lang="en-GB"/>
           </a:p>
@@ -2689,7 +2689,7 @@
           <a:p>
             <a:fld id="{E3435E70-22ED-4931-A57F-15FCCA1F0CAE}" type="datetimeFigureOut">
               <a:rPr lang="en-GB" smtClean="0"/>
-              <a:t>05/02/2023</a:t>
+              <a:t>08/02/2023</a:t>
             </a:fld>
             <a:endParaRPr lang="en-GB"/>
           </a:p>
@@ -2932,7 +2932,7 @@
           <a:p>
             <a:fld id="{E3435E70-22ED-4931-A57F-15FCCA1F0CAE}" type="datetimeFigureOut">
               <a:rPr lang="en-GB" smtClean="0"/>
-              <a:t>05/02/2023</a:t>
+              <a:t>08/02/2023</a:t>
             </a:fld>
             <a:endParaRPr lang="en-GB"/>
           </a:p>
@@ -11205,7 +11205,7 @@
             <a:pPr algn="ctr"/>
             <a:r>
               <a:rPr lang="fr-FR" dirty="0"/>
-              <a:t>C0</a:t>
+              <a:t>0</a:t>
             </a:r>
             <a:endParaRPr lang="en-GB" dirty="0"/>
           </a:p>
@@ -11263,7 +11263,7 @@
             <a:pPr algn="ctr"/>
             <a:r>
               <a:rPr lang="fr-FR" dirty="0"/>
-              <a:t>C1</a:t>
+              <a:t>1</a:t>
             </a:r>
             <a:endParaRPr lang="en-GB" dirty="0"/>
           </a:p>
@@ -11500,7 +11500,7 @@
                   <a:srgbClr val="305496"/>
                 </a:solidFill>
               </a:rPr>
-              <a:t>C2</a:t>
+              <a:t>2</a:t>
             </a:r>
             <a:endParaRPr lang="en-GB" dirty="0">
               <a:solidFill>
@@ -11599,7 +11599,7 @@
             <a:pPr algn="ctr"/>
             <a:r>
               <a:rPr lang="fr-FR" dirty="0"/>
-              <a:t>C3</a:t>
+              <a:t>3</a:t>
             </a:r>
             <a:endParaRPr lang="en-GB" dirty="0"/>
           </a:p>
@@ -12074,7 +12074,7 @@
             <a:pPr algn="ctr"/>
             <a:r>
               <a:rPr lang="fr-FR" dirty="0"/>
-              <a:t>C0</a:t>
+              <a:t>0</a:t>
             </a:r>
             <a:endParaRPr lang="en-GB" dirty="0"/>
           </a:p>
@@ -12132,7 +12132,7 @@
             <a:pPr algn="ctr"/>
             <a:r>
               <a:rPr lang="fr-FR" dirty="0"/>
-              <a:t>C1</a:t>
+              <a:t>1</a:t>
             </a:r>
             <a:endParaRPr lang="en-GB" dirty="0"/>
           </a:p>
@@ -12369,7 +12369,7 @@
                   <a:srgbClr val="305496"/>
                 </a:solidFill>
               </a:rPr>
-              <a:t>C2</a:t>
+              <a:t>2</a:t>
             </a:r>
             <a:endParaRPr lang="en-GB" dirty="0">
               <a:solidFill>
@@ -12468,7 +12468,7 @@
             <a:pPr algn="ctr"/>
             <a:r>
               <a:rPr lang="fr-FR" dirty="0"/>
-              <a:t>C3</a:t>
+              <a:t>3</a:t>
             </a:r>
             <a:endParaRPr lang="en-GB" dirty="0"/>
           </a:p>

</xml_diff>